<commit_message>
few changes to concept
</commit_message>
<xml_diff>
--- a/concept/concept.pptx
+++ b/concept/concept.pptx
@@ -112,6 +112,11 @@
       </a:defRPr>
     </a:lvl9pPr>
   </p:defaultTextStyle>
+  <p:extLst>
+    <p:ext uri="{EFAFB233-063F-42B5-8137-9DF3F51BA10A}">
+      <p15:sldGuideLst xmlns:p15="http://schemas.microsoft.com/office/powerpoint/2012/main"/>
+    </p:ext>
+  </p:extLst>
 </p:presentation>
 </file>
 
@@ -246,7 +251,7 @@
           <a:p>
             <a:fld id="{04F8DF96-2ECA-4A16-BC9D-B2033B943E73}" type="datetimeFigureOut">
               <a:rPr lang="ru-RU" smtClean="0"/>
-              <a:t>05.10.2023</a:t>
+              <a:t>26.10.2023</a:t>
             </a:fld>
             <a:endParaRPr lang="ru-RU"/>
           </a:p>
@@ -416,7 +421,7 @@
           <a:p>
             <a:fld id="{04F8DF96-2ECA-4A16-BC9D-B2033B943E73}" type="datetimeFigureOut">
               <a:rPr lang="ru-RU" smtClean="0"/>
-              <a:t>05.10.2023</a:t>
+              <a:t>26.10.2023</a:t>
             </a:fld>
             <a:endParaRPr lang="ru-RU"/>
           </a:p>
@@ -596,7 +601,7 @@
           <a:p>
             <a:fld id="{04F8DF96-2ECA-4A16-BC9D-B2033B943E73}" type="datetimeFigureOut">
               <a:rPr lang="ru-RU" smtClean="0"/>
-              <a:t>05.10.2023</a:t>
+              <a:t>26.10.2023</a:t>
             </a:fld>
             <a:endParaRPr lang="ru-RU"/>
           </a:p>
@@ -766,7 +771,7 @@
           <a:p>
             <a:fld id="{04F8DF96-2ECA-4A16-BC9D-B2033B943E73}" type="datetimeFigureOut">
               <a:rPr lang="ru-RU" smtClean="0"/>
-              <a:t>05.10.2023</a:t>
+              <a:t>26.10.2023</a:t>
             </a:fld>
             <a:endParaRPr lang="ru-RU"/>
           </a:p>
@@ -1012,7 +1017,7 @@
           <a:p>
             <a:fld id="{04F8DF96-2ECA-4A16-BC9D-B2033B943E73}" type="datetimeFigureOut">
               <a:rPr lang="ru-RU" smtClean="0"/>
-              <a:t>05.10.2023</a:t>
+              <a:t>26.10.2023</a:t>
             </a:fld>
             <a:endParaRPr lang="ru-RU"/>
           </a:p>
@@ -1244,7 +1249,7 @@
           <a:p>
             <a:fld id="{04F8DF96-2ECA-4A16-BC9D-B2033B943E73}" type="datetimeFigureOut">
               <a:rPr lang="ru-RU" smtClean="0"/>
-              <a:t>05.10.2023</a:t>
+              <a:t>26.10.2023</a:t>
             </a:fld>
             <a:endParaRPr lang="ru-RU"/>
           </a:p>
@@ -1611,7 +1616,7 @@
           <a:p>
             <a:fld id="{04F8DF96-2ECA-4A16-BC9D-B2033B943E73}" type="datetimeFigureOut">
               <a:rPr lang="ru-RU" smtClean="0"/>
-              <a:t>05.10.2023</a:t>
+              <a:t>26.10.2023</a:t>
             </a:fld>
             <a:endParaRPr lang="ru-RU"/>
           </a:p>
@@ -1729,7 +1734,7 @@
           <a:p>
             <a:fld id="{04F8DF96-2ECA-4A16-BC9D-B2033B943E73}" type="datetimeFigureOut">
               <a:rPr lang="ru-RU" smtClean="0"/>
-              <a:t>05.10.2023</a:t>
+              <a:t>26.10.2023</a:t>
             </a:fld>
             <a:endParaRPr lang="ru-RU"/>
           </a:p>
@@ -1824,7 +1829,7 @@
           <a:p>
             <a:fld id="{04F8DF96-2ECA-4A16-BC9D-B2033B943E73}" type="datetimeFigureOut">
               <a:rPr lang="ru-RU" smtClean="0"/>
-              <a:t>05.10.2023</a:t>
+              <a:t>26.10.2023</a:t>
             </a:fld>
             <a:endParaRPr lang="ru-RU"/>
           </a:p>
@@ -2101,7 +2106,7 @@
           <a:p>
             <a:fld id="{04F8DF96-2ECA-4A16-BC9D-B2033B943E73}" type="datetimeFigureOut">
               <a:rPr lang="ru-RU" smtClean="0"/>
-              <a:t>05.10.2023</a:t>
+              <a:t>26.10.2023</a:t>
             </a:fld>
             <a:endParaRPr lang="ru-RU"/>
           </a:p>
@@ -2354,7 +2359,7 @@
           <a:p>
             <a:fld id="{04F8DF96-2ECA-4A16-BC9D-B2033B943E73}" type="datetimeFigureOut">
               <a:rPr lang="ru-RU" smtClean="0"/>
-              <a:t>05.10.2023</a:t>
+              <a:t>26.10.2023</a:t>
             </a:fld>
             <a:endParaRPr lang="ru-RU"/>
           </a:p>
@@ -2567,7 +2572,7 @@
           <a:p>
             <a:fld id="{04F8DF96-2ECA-4A16-BC9D-B2033B943E73}" type="datetimeFigureOut">
               <a:rPr lang="ru-RU" smtClean="0"/>
-              <a:t>05.10.2023</a:t>
+              <a:t>26.10.2023</a:t>
             </a:fld>
             <a:endParaRPr lang="ru-RU"/>
           </a:p>
@@ -5528,62 +5533,12 @@
             </a:pPr>
             <a:r>
               <a:rPr lang="ru-RU" dirty="0" smtClean="0"/>
-              <a:t>Система предлагает скрипт, сформулированный на основе собственных прогнозов, чтобы вовремя запасать и выгодно продавать энергию. Также имеются заготовленные под разные стратегии игры скрипты. Пользователь волен редактировать их или вовсе отказаться от них.</a:t>
-            </a:r>
-          </a:p>
-          <a:p>
-            <a:pPr marL="0" indent="0">
-              <a:buNone/>
-            </a:pPr>
-            <a:r>
-              <a:rPr lang="ru-RU" dirty="0" smtClean="0"/>
-              <a:t>Пользователь может заранее прогнозировать влияние своего скрипта на игру. Для этого система берёт из игры данные, имеющиеся на момент запуска прогнозирования (</a:t>
-            </a:r>
-            <a:r>
-              <a:rPr lang="ru-RU" b="1" dirty="0" smtClean="0">
-                <a:solidFill>
-                  <a:srgbClr val="FF0000"/>
-                </a:solidFill>
-              </a:rPr>
-              <a:t>количество запасённой энергии, денежные показатели</a:t>
-            </a:r>
-            <a:r>
-              <a:rPr lang="ru-RU" b="1" dirty="0" smtClean="0">
-                <a:solidFill>
-                  <a:srgbClr val="00B050"/>
-                </a:solidFill>
-              </a:rPr>
-              <a:t>, имеющиеся здания, прогноз погоды и энергии</a:t>
-            </a:r>
-            <a:r>
-              <a:rPr lang="ru-RU" dirty="0" smtClean="0"/>
-              <a:t>), а также скрипт, который пользователь хочет проверить, после чего вырисовывает </a:t>
-            </a:r>
-            <a:r>
-              <a:rPr lang="ru-RU" b="1" dirty="0" smtClean="0">
-                <a:solidFill>
-                  <a:srgbClr val="FF0000"/>
-                </a:solidFill>
-              </a:rPr>
-              <a:t>продолжение уже имеющегося графика игры</a:t>
-            </a:r>
-            <a:r>
-              <a:rPr lang="ru-RU" dirty="0" smtClean="0"/>
-              <a:t> или </a:t>
-            </a:r>
-            <a:r>
-              <a:rPr lang="ru-RU" b="1" dirty="0" smtClean="0">
-                <a:solidFill>
-                  <a:srgbClr val="00B050"/>
-                </a:solidFill>
-              </a:rPr>
-              <a:t>генерирует новый с самого начала</a:t>
-            </a:r>
-            <a:r>
-              <a:rPr lang="ru-RU" dirty="0" smtClean="0"/>
-              <a:t>.</a:t>
-            </a:r>
-            <a:endParaRPr lang="ru-RU" dirty="0"/>
+              <a:t>Система предлагает скрипт, сформулированный на основе собственных прогнозов, чтобы вовремя запасать и выгодно продавать энергию. Также имеются заготовленные под разные стратегии игры </a:t>
+            </a:r>
+            <a:r>
+              <a:rPr lang="ru-RU" dirty="0" smtClean="0"/>
+              <a:t>скрипты.</a:t>
+            </a:r>
           </a:p>
         </p:txBody>
       </p:sp>

</xml_diff>